<commit_message>
video link is updated
</commit_message>
<xml_diff>
--- a/pj-task 3/Presentation.pptx
+++ b/pj-task 3/Presentation.pptx
@@ -22,19 +22,19 @@
   <p:notesSz cx="6858000" cy="9144000"/>
   <p:embeddedFontLst>
     <p:embeddedFont>
-      <p:font typeface="Roboto" panose="020B0604020202020204" charset="0"/>
+      <p:font typeface="Source Code Pro" panose="020B0604020202020204" charset="0"/>
       <p:regular r:id="rId12"/>
       <p:bold r:id="rId13"/>
-      <p:italic r:id="rId14"/>
-      <p:boldItalic r:id="rId15"/>
-    </p:embeddedFont>
-    <p:embeddedFont>
-      <p:font typeface="Source Code Pro" panose="020B0604020202020204" charset="0"/>
-      <p:regular r:id="rId16"/>
-      <p:bold r:id="rId17"/>
     </p:embeddedFont>
     <p:embeddedFont>
       <p:font typeface="Verdana" panose="020B0604030504040204" pitchFamily="34" charset="0"/>
+      <p:regular r:id="rId14"/>
+      <p:bold r:id="rId15"/>
+      <p:italic r:id="rId16"/>
+      <p:boldItalic r:id="rId17"/>
+    </p:embeddedFont>
+    <p:embeddedFont>
+      <p:font typeface="Roboto" panose="020B0604020202020204" charset="0"/>
       <p:regular r:id="rId18"/>
       <p:bold r:id="rId19"/>
       <p:italic r:id="rId20"/>
@@ -243,6 +243,11 @@
       </a:defRPr>
     </a:lvl9pPr>
   </p:defaultTextStyle>
+  <p:extLst>
+    <p:ext uri="{EFAFB233-063F-42B5-8137-9DF3F51BA10A}">
+      <p15:sldGuideLst xmlns:p15="http://schemas.microsoft.com/office/powerpoint/2012/main"/>
+    </p:ext>
+  </p:extLst>
 </p:presentation>
 </file>
 
@@ -7339,7 +7344,7 @@
             </a:pPr>
             <a:r>
               <a:rPr lang="en" dirty="0" smtClean="0"/>
-              <a:t>Video Link</a:t>
+              <a:t>Concept Video Link Youtube</a:t>
             </a:r>
             <a:endParaRPr lang="en" dirty="0"/>
           </a:p>
@@ -7376,35 +7381,27 @@
               </a:spcBef>
               <a:buNone/>
             </a:pPr>
+            <a:endParaRPr lang="en-US" b="1" dirty="0" smtClean="0"/>
+          </a:p>
+          <a:p>
+            <a:pPr lvl="0"/>
+            <a:r>
+              <a:rPr lang="en-US" b="1" dirty="0">
+                <a:hlinkClick r:id="rId3"/>
+              </a:rPr>
+              <a:t>https://</a:t>
+            </a:r>
+            <a:r>
+              <a:rPr lang="en-US" b="1" dirty="0" smtClean="0">
+                <a:hlinkClick r:id="rId3"/>
+              </a:rPr>
+              <a:t>www.youtube.com/watch?v=SiwLQVnivtc&amp;feature=youtu.be</a:t>
+            </a:r>
+            <a:endParaRPr lang="en-US" b="1" dirty="0" smtClean="0"/>
+          </a:p>
+          <a:p>
+            <a:pPr lvl="0"/>
             <a:endParaRPr b="1" dirty="0"/>
-          </a:p>
-        </p:txBody>
-      </p:sp>
-      <p:sp>
-        <p:nvSpPr>
-          <p:cNvPr id="2" name="Rectangle 1"/>
-          <p:cNvSpPr/>
-          <p:nvPr/>
-        </p:nvSpPr>
-        <p:spPr>
-          <a:xfrm>
-            <a:off x="2500759" y="2417862"/>
-            <a:ext cx="4142481" cy="307777"/>
-          </a:xfrm>
-          <a:prstGeom prst="rect">
-            <a:avLst/>
-          </a:prstGeom>
-        </p:spPr>
-        <p:txBody>
-          <a:bodyPr wrap="none">
-            <a:spAutoFit/>
-          </a:bodyPr>
-          <a:lstStyle/>
-          <a:p>
-            <a:r>
-              <a:rPr lang="en-US" dirty="0"/>
-              <a:t>https://www.youtube.com/watch?v=bJz63hRElCM</a:t>
-            </a:r>
           </a:p>
         </p:txBody>
       </p:sp>
@@ -7418,6 +7415,13 @@
   <p:clrMapOvr>
     <a:masterClrMapping/>
   </p:clrMapOvr>
+  <p:timing>
+    <p:tnLst>
+      <p:par>
+        <p:cTn id="1" dur="indefinite" restart="never" nodeType="tmRoot"/>
+      </p:par>
+    </p:tnLst>
+  </p:timing>
 </p:sld>
 </file>
 

</xml_diff>